<commit_message>
update livy rsc docs
</commit_message>
<xml_diff>
--- a/docs/ecosystem/livy/livy-figures.pptx
+++ b/docs/ecosystem/livy/livy-figures.pptx
@@ -7,6 +7,7 @@
   <p:sldIdLst>
     <p:sldId id="256" r:id="rId2"/>
     <p:sldId id="257" r:id="rId3"/>
+    <p:sldId id="258" r:id="rId4"/>
   </p:sldIdLst>
   <p:sldSz cx="12192000" cy="6858000"/>
   <p:notesSz cx="6858000" cy="9144000"/>
@@ -260,7 +261,7 @@
           <a:p>
             <a:fld id="{F1D04C89-61A8-AA47-AE93-370E617C8A8A}" type="datetimeFigureOut">
               <a:rPr lang="en-US" smtClean="0"/>
-              <a:t>12/28/18</a:t>
+              <a:t>1/10/19</a:t>
             </a:fld>
             <a:endParaRPr lang="en-US"/>
           </a:p>
@@ -458,7 +459,7 @@
           <a:p>
             <a:fld id="{F1D04C89-61A8-AA47-AE93-370E617C8A8A}" type="datetimeFigureOut">
               <a:rPr lang="en-US" smtClean="0"/>
-              <a:t>12/28/18</a:t>
+              <a:t>1/10/19</a:t>
             </a:fld>
             <a:endParaRPr lang="en-US"/>
           </a:p>
@@ -666,7 +667,7 @@
           <a:p>
             <a:fld id="{F1D04C89-61A8-AA47-AE93-370E617C8A8A}" type="datetimeFigureOut">
               <a:rPr lang="en-US" smtClean="0"/>
-              <a:t>12/28/18</a:t>
+              <a:t>1/10/19</a:t>
             </a:fld>
             <a:endParaRPr lang="en-US"/>
           </a:p>
@@ -864,7 +865,7 @@
           <a:p>
             <a:fld id="{F1D04C89-61A8-AA47-AE93-370E617C8A8A}" type="datetimeFigureOut">
               <a:rPr lang="en-US" smtClean="0"/>
-              <a:t>12/28/18</a:t>
+              <a:t>1/10/19</a:t>
             </a:fld>
             <a:endParaRPr lang="en-US"/>
           </a:p>
@@ -1139,7 +1140,7 @@
           <a:p>
             <a:fld id="{F1D04C89-61A8-AA47-AE93-370E617C8A8A}" type="datetimeFigureOut">
               <a:rPr lang="en-US" smtClean="0"/>
-              <a:t>12/28/18</a:t>
+              <a:t>1/10/19</a:t>
             </a:fld>
             <a:endParaRPr lang="en-US"/>
           </a:p>
@@ -1404,7 +1405,7 @@
           <a:p>
             <a:fld id="{F1D04C89-61A8-AA47-AE93-370E617C8A8A}" type="datetimeFigureOut">
               <a:rPr lang="en-US" smtClean="0"/>
-              <a:t>12/28/18</a:t>
+              <a:t>1/10/19</a:t>
             </a:fld>
             <a:endParaRPr lang="en-US"/>
           </a:p>
@@ -1816,7 +1817,7 @@
           <a:p>
             <a:fld id="{F1D04C89-61A8-AA47-AE93-370E617C8A8A}" type="datetimeFigureOut">
               <a:rPr lang="en-US" smtClean="0"/>
-              <a:t>12/28/18</a:t>
+              <a:t>1/10/19</a:t>
             </a:fld>
             <a:endParaRPr lang="en-US"/>
           </a:p>
@@ -1957,7 +1958,7 @@
           <a:p>
             <a:fld id="{F1D04C89-61A8-AA47-AE93-370E617C8A8A}" type="datetimeFigureOut">
               <a:rPr lang="en-US" smtClean="0"/>
-              <a:t>12/28/18</a:t>
+              <a:t>1/10/19</a:t>
             </a:fld>
             <a:endParaRPr lang="en-US"/>
           </a:p>
@@ -2070,7 +2071,7 @@
           <a:p>
             <a:fld id="{F1D04C89-61A8-AA47-AE93-370E617C8A8A}" type="datetimeFigureOut">
               <a:rPr lang="en-US" smtClean="0"/>
-              <a:t>12/28/18</a:t>
+              <a:t>1/10/19</a:t>
             </a:fld>
             <a:endParaRPr lang="en-US"/>
           </a:p>
@@ -2381,7 +2382,7 @@
           <a:p>
             <a:fld id="{F1D04C89-61A8-AA47-AE93-370E617C8A8A}" type="datetimeFigureOut">
               <a:rPr lang="en-US" smtClean="0"/>
-              <a:t>12/28/18</a:t>
+              <a:t>1/10/19</a:t>
             </a:fld>
             <a:endParaRPr lang="en-US"/>
           </a:p>
@@ -2669,7 +2670,7 @@
           <a:p>
             <a:fld id="{F1D04C89-61A8-AA47-AE93-370E617C8A8A}" type="datetimeFigureOut">
               <a:rPr lang="en-US" smtClean="0"/>
-              <a:t>12/28/18</a:t>
+              <a:t>1/10/19</a:t>
             </a:fld>
             <a:endParaRPr lang="en-US"/>
           </a:p>
@@ -2910,7 +2911,7 @@
           <a:p>
             <a:fld id="{F1D04C89-61A8-AA47-AE93-370E617C8A8A}" type="datetimeFigureOut">
               <a:rPr lang="en-US" smtClean="0"/>
-              <a:t>12/28/18</a:t>
+              <a:t>1/10/19</a:t>
             </a:fld>
             <a:endParaRPr lang="en-US"/>
           </a:p>
@@ -7715,6 +7716,630 @@
 </p:sld>
 </file>
 
+<file path=ppt/slides/slide3.xml><?xml version="1.0" encoding="utf-8"?>
+<p:sld xmlns:a="http://schemas.openxmlformats.org/drawingml/2006/main" xmlns:r="http://schemas.openxmlformats.org/officeDocument/2006/relationships" xmlns:p="http://schemas.openxmlformats.org/presentationml/2006/main">
+  <p:cSld>
+    <p:spTree>
+      <p:nvGrpSpPr>
+        <p:cNvPr id="1" name=""/>
+        <p:cNvGrpSpPr/>
+        <p:nvPr/>
+      </p:nvGrpSpPr>
+      <p:grpSpPr>
+        <a:xfrm>
+          <a:off x="0" y="0"/>
+          <a:ext cx="0" cy="0"/>
+          <a:chOff x="0" y="0"/>
+          <a:chExt cx="0" cy="0"/>
+        </a:xfrm>
+      </p:grpSpPr>
+      <p:sp>
+        <p:nvSpPr>
+          <p:cNvPr id="4" name="Rectangle 3">
+            <a:extLst>
+              <a:ext uri="{FF2B5EF4-FFF2-40B4-BE49-F238E27FC236}">
+                <a16:creationId xmlns:a16="http://schemas.microsoft.com/office/drawing/2014/main" id="{D2B38A0B-1AE1-EF4A-999E-0262032E6AAB}"/>
+              </a:ext>
+            </a:extLst>
+          </p:cNvPr>
+          <p:cNvSpPr/>
+          <p:nvPr/>
+        </p:nvSpPr>
+        <p:spPr>
+          <a:xfrm>
+            <a:off x="2260318" y="1849348"/>
+            <a:ext cx="2897312" cy="3113070"/>
+          </a:xfrm>
+          <a:prstGeom prst="rect">
+            <a:avLst/>
+          </a:prstGeom>
+        </p:spPr>
+        <p:style>
+          <a:lnRef idx="2">
+            <a:schemeClr val="dk1"/>
+          </a:lnRef>
+          <a:fillRef idx="1">
+            <a:schemeClr val="lt1"/>
+          </a:fillRef>
+          <a:effectRef idx="0">
+            <a:schemeClr val="dk1"/>
+          </a:effectRef>
+          <a:fontRef idx="minor">
+            <a:schemeClr val="dk1"/>
+          </a:fontRef>
+        </p:style>
+        <p:txBody>
+          <a:bodyPr rtlCol="0" anchor="ctr"/>
+          <a:lstStyle/>
+          <a:p>
+            <a:pPr algn="ctr"/>
+            <a:endParaRPr lang="en-US"/>
+          </a:p>
+        </p:txBody>
+      </p:sp>
+      <p:sp>
+        <p:nvSpPr>
+          <p:cNvPr id="5" name="Rectangle 4">
+            <a:extLst>
+              <a:ext uri="{FF2B5EF4-FFF2-40B4-BE49-F238E27FC236}">
+                <a16:creationId xmlns:a16="http://schemas.microsoft.com/office/drawing/2014/main" id="{C4B7E8EA-D480-4449-8B33-7250480C8DAA}"/>
+              </a:ext>
+            </a:extLst>
+          </p:cNvPr>
+          <p:cNvSpPr/>
+          <p:nvPr/>
+        </p:nvSpPr>
+        <p:spPr>
+          <a:xfrm>
+            <a:off x="7378562" y="1849348"/>
+            <a:ext cx="2628470" cy="3113070"/>
+          </a:xfrm>
+          <a:prstGeom prst="rect">
+            <a:avLst/>
+          </a:prstGeom>
+        </p:spPr>
+        <p:style>
+          <a:lnRef idx="2">
+            <a:schemeClr val="dk1"/>
+          </a:lnRef>
+          <a:fillRef idx="1">
+            <a:schemeClr val="lt1"/>
+          </a:fillRef>
+          <a:effectRef idx="0">
+            <a:schemeClr val="dk1"/>
+          </a:effectRef>
+          <a:fontRef idx="minor">
+            <a:schemeClr val="dk1"/>
+          </a:fontRef>
+        </p:style>
+        <p:txBody>
+          <a:bodyPr rtlCol="0" anchor="ctr"/>
+          <a:lstStyle/>
+          <a:p>
+            <a:pPr algn="ctr"/>
+            <a:endParaRPr lang="en-US"/>
+          </a:p>
+        </p:txBody>
+      </p:sp>
+      <p:sp>
+        <p:nvSpPr>
+          <p:cNvPr id="6" name="Rectangle 5">
+            <a:extLst>
+              <a:ext uri="{FF2B5EF4-FFF2-40B4-BE49-F238E27FC236}">
+                <a16:creationId xmlns:a16="http://schemas.microsoft.com/office/drawing/2014/main" id="{5676325B-A093-2F4C-A47E-64A02CA7C191}"/>
+              </a:ext>
+            </a:extLst>
+          </p:cNvPr>
+          <p:cNvSpPr/>
+          <p:nvPr/>
+        </p:nvSpPr>
+        <p:spPr>
+          <a:xfrm>
+            <a:off x="2957245" y="2805699"/>
+            <a:ext cx="1380165" cy="731179"/>
+          </a:xfrm>
+          <a:prstGeom prst="rect">
+            <a:avLst/>
+          </a:prstGeom>
+        </p:spPr>
+        <p:style>
+          <a:lnRef idx="2">
+            <a:schemeClr val="dk1"/>
+          </a:lnRef>
+          <a:fillRef idx="1">
+            <a:schemeClr val="lt1"/>
+          </a:fillRef>
+          <a:effectRef idx="0">
+            <a:schemeClr val="dk1"/>
+          </a:effectRef>
+          <a:fontRef idx="minor">
+            <a:schemeClr val="dk1"/>
+          </a:fontRef>
+        </p:style>
+        <p:txBody>
+          <a:bodyPr rtlCol="0" anchor="ctr"/>
+          <a:lstStyle/>
+          <a:p>
+            <a:pPr algn="ctr"/>
+            <a:r>
+              <a:rPr lang="en-US" dirty="0"/>
+              <a:t>RPCServer</a:t>
+            </a:r>
+          </a:p>
+        </p:txBody>
+      </p:sp>
+      <p:sp>
+        <p:nvSpPr>
+          <p:cNvPr id="7" name="Rectangle 6">
+            <a:extLst>
+              <a:ext uri="{FF2B5EF4-FFF2-40B4-BE49-F238E27FC236}">
+                <a16:creationId xmlns:a16="http://schemas.microsoft.com/office/drawing/2014/main" id="{6F791CCB-0A40-5046-91E2-22B6587F687E}"/>
+              </a:ext>
+            </a:extLst>
+          </p:cNvPr>
+          <p:cNvSpPr/>
+          <p:nvPr/>
+        </p:nvSpPr>
+        <p:spPr>
+          <a:xfrm>
+            <a:off x="7772007" y="2754328"/>
+            <a:ext cx="1575373" cy="731179"/>
+          </a:xfrm>
+          <a:prstGeom prst="rect">
+            <a:avLst/>
+          </a:prstGeom>
+        </p:spPr>
+        <p:style>
+          <a:lnRef idx="2">
+            <a:schemeClr val="dk1"/>
+          </a:lnRef>
+          <a:fillRef idx="1">
+            <a:schemeClr val="lt1"/>
+          </a:fillRef>
+          <a:effectRef idx="0">
+            <a:schemeClr val="dk1"/>
+          </a:effectRef>
+          <a:fontRef idx="minor">
+            <a:schemeClr val="dk1"/>
+          </a:fontRef>
+        </p:style>
+        <p:txBody>
+          <a:bodyPr rtlCol="0" anchor="ctr"/>
+          <a:lstStyle/>
+          <a:p>
+            <a:pPr algn="ctr"/>
+            <a:r>
+              <a:rPr lang="en-US" dirty="0"/>
+              <a:t>SparkContext</a:t>
+            </a:r>
+          </a:p>
+        </p:txBody>
+      </p:sp>
+      <p:sp>
+        <p:nvSpPr>
+          <p:cNvPr id="9" name="TextBox 8">
+            <a:extLst>
+              <a:ext uri="{FF2B5EF4-FFF2-40B4-BE49-F238E27FC236}">
+                <a16:creationId xmlns:a16="http://schemas.microsoft.com/office/drawing/2014/main" id="{B9D909F1-9ABB-3D45-92EC-9DBD25382F38}"/>
+              </a:ext>
+            </a:extLst>
+          </p:cNvPr>
+          <p:cNvSpPr txBox="1"/>
+          <p:nvPr/>
+        </p:nvSpPr>
+        <p:spPr>
+          <a:xfrm>
+            <a:off x="7772007" y="1863583"/>
+            <a:ext cx="1478546" cy="369332"/>
+          </a:xfrm>
+          <a:prstGeom prst="rect">
+            <a:avLst/>
+          </a:prstGeom>
+          <a:noFill/>
+        </p:spPr>
+        <p:txBody>
+          <a:bodyPr wrap="none" rtlCol="0">
+            <a:spAutoFit/>
+          </a:bodyPr>
+          <a:lstStyle/>
+          <a:p>
+            <a:r>
+              <a:rPr lang="en-US" dirty="0"/>
+              <a:t>remote driver</a:t>
+            </a:r>
+          </a:p>
+        </p:txBody>
+      </p:sp>
+      <p:sp>
+        <p:nvSpPr>
+          <p:cNvPr id="10" name="TextBox 9">
+            <a:extLst>
+              <a:ext uri="{FF2B5EF4-FFF2-40B4-BE49-F238E27FC236}">
+                <a16:creationId xmlns:a16="http://schemas.microsoft.com/office/drawing/2014/main" id="{F8E4E347-E11B-2946-A950-327EF5618264}"/>
+              </a:ext>
+            </a:extLst>
+          </p:cNvPr>
+          <p:cNvSpPr txBox="1"/>
+          <p:nvPr/>
+        </p:nvSpPr>
+        <p:spPr>
+          <a:xfrm>
+            <a:off x="2676889" y="1863582"/>
+            <a:ext cx="2047099" cy="369332"/>
+          </a:xfrm>
+          <a:prstGeom prst="rect">
+            <a:avLst/>
+          </a:prstGeom>
+          <a:noFill/>
+        </p:spPr>
+        <p:txBody>
+          <a:bodyPr wrap="none" rtlCol="0">
+            <a:spAutoFit/>
+          </a:bodyPr>
+          <a:lstStyle/>
+          <a:p>
+            <a:r>
+              <a:rPr lang="en-US" dirty="0"/>
+              <a:t>remote driver client</a:t>
+            </a:r>
+          </a:p>
+        </p:txBody>
+      </p:sp>
+      <p:cxnSp>
+        <p:nvCxnSpPr>
+          <p:cNvPr id="12" name="Curved Connector 11">
+            <a:extLst>
+              <a:ext uri="{FF2B5EF4-FFF2-40B4-BE49-F238E27FC236}">
+                <a16:creationId xmlns:a16="http://schemas.microsoft.com/office/drawing/2014/main" id="{3F12E309-AEFE-AA46-BDAE-F8B868E188FF}"/>
+              </a:ext>
+            </a:extLst>
+          </p:cNvPr>
+          <p:cNvCxnSpPr>
+            <a:cxnSpLocks/>
+            <a:stCxn id="10" idx="2"/>
+            <a:endCxn id="6" idx="0"/>
+          </p:cNvCxnSpPr>
+          <p:nvPr/>
+        </p:nvCxnSpPr>
+        <p:spPr>
+          <a:xfrm rot="5400000">
+            <a:off x="3387492" y="2492751"/>
+            <a:ext cx="572785" cy="53111"/>
+          </a:xfrm>
+          <a:prstGeom prst="curvedConnector3">
+            <a:avLst>
+              <a:gd name="adj1" fmla="val 50000"/>
+            </a:avLst>
+          </a:prstGeom>
+          <a:ln>
+            <a:tailEnd type="triangle"/>
+          </a:ln>
+        </p:spPr>
+        <p:style>
+          <a:lnRef idx="1">
+            <a:schemeClr val="accent1"/>
+          </a:lnRef>
+          <a:fillRef idx="0">
+            <a:schemeClr val="accent1"/>
+          </a:fillRef>
+          <a:effectRef idx="0">
+            <a:schemeClr val="accent1"/>
+          </a:effectRef>
+          <a:fontRef idx="minor">
+            <a:schemeClr val="tx1"/>
+          </a:fontRef>
+        </p:style>
+      </p:cxnSp>
+      <p:sp>
+        <p:nvSpPr>
+          <p:cNvPr id="15" name="TextBox 14">
+            <a:extLst>
+              <a:ext uri="{FF2B5EF4-FFF2-40B4-BE49-F238E27FC236}">
+                <a16:creationId xmlns:a16="http://schemas.microsoft.com/office/drawing/2014/main" id="{B12DD5A9-4C34-8147-B35F-747D93D42E5B}"/>
+              </a:ext>
+            </a:extLst>
+          </p:cNvPr>
+          <p:cNvSpPr txBox="1"/>
+          <p:nvPr/>
+        </p:nvSpPr>
+        <p:spPr>
+          <a:xfrm>
+            <a:off x="3700438" y="2260848"/>
+            <a:ext cx="1084336" cy="369332"/>
+          </a:xfrm>
+          <a:prstGeom prst="rect">
+            <a:avLst/>
+          </a:prstGeom>
+          <a:noFill/>
+        </p:spPr>
+        <p:txBody>
+          <a:bodyPr wrap="none" rtlCol="0">
+            <a:spAutoFit/>
+          </a:bodyPr>
+          <a:lstStyle/>
+          <a:p>
+            <a:r>
+              <a:rPr lang="en-US" dirty="0"/>
+              <a:t>(1) create</a:t>
+            </a:r>
+          </a:p>
+        </p:txBody>
+      </p:sp>
+      <p:sp>
+        <p:nvSpPr>
+          <p:cNvPr id="16" name="TextBox 15">
+            <a:extLst>
+              <a:ext uri="{FF2B5EF4-FFF2-40B4-BE49-F238E27FC236}">
+                <a16:creationId xmlns:a16="http://schemas.microsoft.com/office/drawing/2014/main" id="{20ED9DC2-78D7-A84F-B954-7DA362C28E34}"/>
+              </a:ext>
+            </a:extLst>
+          </p:cNvPr>
+          <p:cNvSpPr txBox="1"/>
+          <p:nvPr/>
+        </p:nvSpPr>
+        <p:spPr>
+          <a:xfrm>
+            <a:off x="5599741" y="2119058"/>
+            <a:ext cx="1103187" cy="369332"/>
+          </a:xfrm>
+          <a:prstGeom prst="rect">
+            <a:avLst/>
+          </a:prstGeom>
+          <a:noFill/>
+        </p:spPr>
+        <p:txBody>
+          <a:bodyPr wrap="none" rtlCol="0">
+            <a:spAutoFit/>
+          </a:bodyPr>
+          <a:lstStyle/>
+          <a:p>
+            <a:r>
+              <a:rPr lang="en-US" dirty="0"/>
+              <a:t>(2) spawn</a:t>
+            </a:r>
+          </a:p>
+        </p:txBody>
+      </p:sp>
+      <p:cxnSp>
+        <p:nvCxnSpPr>
+          <p:cNvPr id="18" name="Curved Connector 17">
+            <a:extLst>
+              <a:ext uri="{FF2B5EF4-FFF2-40B4-BE49-F238E27FC236}">
+                <a16:creationId xmlns:a16="http://schemas.microsoft.com/office/drawing/2014/main" id="{6D76AA48-4E62-B944-A9C8-8361BD94F0F0}"/>
+              </a:ext>
+            </a:extLst>
+          </p:cNvPr>
+          <p:cNvCxnSpPr>
+            <a:cxnSpLocks/>
+          </p:cNvCxnSpPr>
+          <p:nvPr/>
+        </p:nvCxnSpPr>
+        <p:spPr>
+          <a:xfrm>
+            <a:off x="5157630" y="2551680"/>
+            <a:ext cx="2220932" cy="1"/>
+          </a:xfrm>
+          <a:prstGeom prst="curvedConnector3">
+            <a:avLst/>
+          </a:prstGeom>
+          <a:ln>
+            <a:tailEnd type="triangle"/>
+          </a:ln>
+        </p:spPr>
+        <p:style>
+          <a:lnRef idx="1">
+            <a:schemeClr val="accent1"/>
+          </a:lnRef>
+          <a:fillRef idx="0">
+            <a:schemeClr val="accent1"/>
+          </a:fillRef>
+          <a:effectRef idx="0">
+            <a:schemeClr val="accent1"/>
+          </a:effectRef>
+          <a:fontRef idx="minor">
+            <a:schemeClr val="tx1"/>
+          </a:fontRef>
+        </p:style>
+      </p:cxnSp>
+      <p:sp>
+        <p:nvSpPr>
+          <p:cNvPr id="19" name="TextBox 18">
+            <a:extLst>
+              <a:ext uri="{FF2B5EF4-FFF2-40B4-BE49-F238E27FC236}">
+                <a16:creationId xmlns:a16="http://schemas.microsoft.com/office/drawing/2014/main" id="{BEAAAECB-A750-8347-8616-F57133ABDB36}"/>
+              </a:ext>
+            </a:extLst>
+          </p:cNvPr>
+          <p:cNvSpPr txBox="1"/>
+          <p:nvPr/>
+        </p:nvSpPr>
+        <p:spPr>
+          <a:xfrm>
+            <a:off x="4387071" y="2836134"/>
+            <a:ext cx="2301410" cy="646331"/>
+          </a:xfrm>
+          <a:prstGeom prst="rect">
+            <a:avLst/>
+          </a:prstGeom>
+          <a:noFill/>
+        </p:spPr>
+        <p:txBody>
+          <a:bodyPr wrap="square" rtlCol="0">
+            <a:spAutoFit/>
+          </a:bodyPr>
+          <a:lstStyle/>
+          <a:p>
+            <a:r>
+              <a:rPr lang="en-US" dirty="0"/>
+              <a:t>(3) Wait for remote driver to connect back</a:t>
+            </a:r>
+          </a:p>
+        </p:txBody>
+      </p:sp>
+      <p:sp>
+        <p:nvSpPr>
+          <p:cNvPr id="20" name="TextBox 19">
+            <a:extLst>
+              <a:ext uri="{FF2B5EF4-FFF2-40B4-BE49-F238E27FC236}">
+                <a16:creationId xmlns:a16="http://schemas.microsoft.com/office/drawing/2014/main" id="{E39DEB29-BC9E-4240-82C2-DDBBB5BB960E}"/>
+              </a:ext>
+            </a:extLst>
+          </p:cNvPr>
+          <p:cNvSpPr txBox="1"/>
+          <p:nvPr/>
+        </p:nvSpPr>
+        <p:spPr>
+          <a:xfrm>
+            <a:off x="5366858" y="3654741"/>
+            <a:ext cx="1790487" cy="369332"/>
+          </a:xfrm>
+          <a:prstGeom prst="rect">
+            <a:avLst/>
+          </a:prstGeom>
+          <a:noFill/>
+        </p:spPr>
+        <p:txBody>
+          <a:bodyPr wrap="square" rtlCol="0">
+            <a:spAutoFit/>
+          </a:bodyPr>
+          <a:lstStyle/>
+          <a:p>
+            <a:r>
+              <a:rPr lang="en-US" dirty="0"/>
+              <a:t>(4) connect back</a:t>
+            </a:r>
+          </a:p>
+        </p:txBody>
+      </p:sp>
+      <p:sp>
+        <p:nvSpPr>
+          <p:cNvPr id="21" name="TextBox 20">
+            <a:extLst>
+              <a:ext uri="{FF2B5EF4-FFF2-40B4-BE49-F238E27FC236}">
+                <a16:creationId xmlns:a16="http://schemas.microsoft.com/office/drawing/2014/main" id="{C268EFD5-CBAA-364A-AE1F-1B89AB7862CF}"/>
+              </a:ext>
+            </a:extLst>
+          </p:cNvPr>
+          <p:cNvSpPr txBox="1"/>
+          <p:nvPr/>
+        </p:nvSpPr>
+        <p:spPr>
+          <a:xfrm>
+            <a:off x="5128522" y="4267736"/>
+            <a:ext cx="2301410" cy="369332"/>
+          </a:xfrm>
+          <a:prstGeom prst="rect">
+            <a:avLst/>
+          </a:prstGeom>
+          <a:noFill/>
+        </p:spPr>
+        <p:txBody>
+          <a:bodyPr wrap="square" rtlCol="0">
+            <a:spAutoFit/>
+          </a:bodyPr>
+          <a:lstStyle/>
+          <a:p>
+            <a:r>
+              <a:rPr lang="en-US" dirty="0"/>
+              <a:t>(5) session established</a:t>
+            </a:r>
+          </a:p>
+        </p:txBody>
+      </p:sp>
+      <p:cxnSp>
+        <p:nvCxnSpPr>
+          <p:cNvPr id="25" name="Straight Arrow Connector 24">
+            <a:extLst>
+              <a:ext uri="{FF2B5EF4-FFF2-40B4-BE49-F238E27FC236}">
+                <a16:creationId xmlns:a16="http://schemas.microsoft.com/office/drawing/2014/main" id="{1EF6CAA6-A8E8-A542-8DB5-DF45B9611BC0}"/>
+              </a:ext>
+            </a:extLst>
+          </p:cNvPr>
+          <p:cNvCxnSpPr>
+            <a:cxnSpLocks/>
+          </p:cNvCxnSpPr>
+          <p:nvPr/>
+        </p:nvCxnSpPr>
+        <p:spPr>
+          <a:xfrm flipH="1">
+            <a:off x="5157631" y="4026931"/>
+            <a:ext cx="2208943" cy="0"/>
+          </a:xfrm>
+          <a:prstGeom prst="straightConnector1">
+            <a:avLst/>
+          </a:prstGeom>
+          <a:ln>
+            <a:tailEnd type="triangle"/>
+          </a:ln>
+        </p:spPr>
+        <p:style>
+          <a:lnRef idx="1">
+            <a:schemeClr val="accent1"/>
+          </a:lnRef>
+          <a:fillRef idx="0">
+            <a:schemeClr val="accent1"/>
+          </a:fillRef>
+          <a:effectRef idx="0">
+            <a:schemeClr val="accent1"/>
+          </a:effectRef>
+          <a:fontRef idx="minor">
+            <a:schemeClr val="tx1"/>
+          </a:fontRef>
+        </p:style>
+      </p:cxnSp>
+      <p:cxnSp>
+        <p:nvCxnSpPr>
+          <p:cNvPr id="28" name="Straight Arrow Connector 27">
+            <a:extLst>
+              <a:ext uri="{FF2B5EF4-FFF2-40B4-BE49-F238E27FC236}">
+                <a16:creationId xmlns:a16="http://schemas.microsoft.com/office/drawing/2014/main" id="{2C63DE40-9539-9D47-8ACC-B3FEE4CBFFB0}"/>
+              </a:ext>
+            </a:extLst>
+          </p:cNvPr>
+          <p:cNvCxnSpPr/>
+          <p:nvPr/>
+        </p:nvCxnSpPr>
+        <p:spPr>
+          <a:xfrm>
+            <a:off x="5157630" y="4667890"/>
+            <a:ext cx="2208944" cy="0"/>
+          </a:xfrm>
+          <a:prstGeom prst="straightConnector1">
+            <a:avLst/>
+          </a:prstGeom>
+          <a:ln>
+            <a:headEnd type="triangle"/>
+            <a:tailEnd type="triangle"/>
+          </a:ln>
+        </p:spPr>
+        <p:style>
+          <a:lnRef idx="1">
+            <a:schemeClr val="accent1"/>
+          </a:lnRef>
+          <a:fillRef idx="0">
+            <a:schemeClr val="accent1"/>
+          </a:fillRef>
+          <a:effectRef idx="0">
+            <a:schemeClr val="accent1"/>
+          </a:effectRef>
+          <a:fontRef idx="minor">
+            <a:schemeClr val="tx1"/>
+          </a:fontRef>
+        </p:style>
+      </p:cxnSp>
+    </p:spTree>
+    <p:extLst>
+      <p:ext uri="{BB962C8B-B14F-4D97-AF65-F5344CB8AC3E}">
+        <p14:creationId xmlns:p14="http://schemas.microsoft.com/office/powerpoint/2010/main" val="1443828255"/>
+      </p:ext>
+    </p:extLst>
+  </p:cSld>
+  <p:clrMapOvr>
+    <a:masterClrMapping/>
+  </p:clrMapOvr>
+</p:sld>
+</file>
+
 <file path=ppt/theme/theme1.xml><?xml version="1.0" encoding="utf-8"?>
 <a:theme xmlns:a="http://schemas.openxmlformats.org/drawingml/2006/main" name="Office Theme">
   <a:themeElements>

</xml_diff>